<commit_message>
pdf music moves Phase 1 und 2 eingeckeckt
</commit_message>
<xml_diff>
--- a/training-cards/music moves/01_musicmoves_templates/Aufbau_einer_Karte.pptx
+++ b/training-cards/music moves/01_musicmoves_templates/Aufbau_einer_Karte.pptx
@@ -565,7 +565,7 @@
           <a:p>
             <a:fld id="{FF5B2BAF-DF38-0A48-A798-0C06E514FD52}" type="datetimeFigureOut">
               <a:rPr lang="de-DE" smtClean="0"/>
-              <a:t>12.10.15</a:t>
+              <a:t>14.10.15</a:t>
             </a:fld>
             <a:endParaRPr lang="de-DE" dirty="0"/>
           </a:p>
@@ -787,7 +787,7 @@
           <a:p>
             <a:fld id="{FF5B2BAF-DF38-0A48-A798-0C06E514FD52}" type="datetimeFigureOut">
               <a:rPr lang="de-DE" smtClean="0"/>
-              <a:t>12.10.15</a:t>
+              <a:t>14.10.15</a:t>
             </a:fld>
             <a:endParaRPr lang="de-DE" dirty="0"/>
           </a:p>
@@ -1570,15 +1570,19 @@
           <a:p>
             <a:r>
               <a:rPr lang="de-DE" sz="1400" dirty="0" smtClean="0"/>
-              <a:t>In klaren Handlungsanweisungen </a:t>
+              <a:t>In klaren Handlungsanweisungen und mit genauen Zahlen über Zeitraum und Anzahl der Wiederholungen wird ein handfestes Training definiert, </a:t>
+            </a:r>
+            <a:r>
+              <a:rPr lang="de-DE" sz="1400" smtClean="0"/>
+              <a:t>das </a:t>
+            </a:r>
+            <a:r>
+              <a:rPr lang="de-DE" sz="1400" smtClean="0"/>
+              <a:t>eins </a:t>
             </a:r>
             <a:r>
               <a:rPr lang="de-DE" sz="1400" dirty="0" smtClean="0"/>
-              <a:t>und mit genauen Zahlen über Zeitraum und Anzahl der Wiederholungen w</a:t>
-            </a:r>
-            <a:r>
-              <a:rPr lang="de-DE" sz="1400" dirty="0" smtClean="0"/>
-              <a:t>ird ein handfestes Training definiert, das ein zu eins umgesetzt werden kann.</a:t>
+              <a:t>zu eins umgesetzt werden kann.</a:t>
             </a:r>
           </a:p>
           <a:p>
@@ -1598,7 +1602,11 @@
             </a:br>
             <a:r>
               <a:rPr lang="de-DE" sz="1400" dirty="0" smtClean="0"/>
-              <a:t> bedeutet „</a:t>
+              <a:t>bedeutet </a:t>
+            </a:r>
+            <a:r>
+              <a:rPr lang="de-DE" sz="1400" dirty="0" smtClean="0"/>
+              <a:t>„</a:t>
             </a:r>
             <a:r>
               <a:rPr lang="de-DE" sz="1400" dirty="0" err="1" smtClean="0"/>

</xml_diff>